<commit_message>
Update 14-rmarkdown.qmd and associated files to enhance content clarity and organization. Change code chunk formatting from markdown to text for consistency. Update metadata for improved SEO and social sharing, including revised last modified timestamps. Adjust sitemap.xml to reflect the latest changes in the HTML file.
</commit_message>
<xml_diff>
--- a/.slides/topics/14_rmarkdown.pptx
+++ b/.slides/topics/14_rmarkdown.pptx
@@ -17,6 +17,7 @@
     <p:sldId id="265" r:id="rId11"/>
     <p:sldId id="266" r:id="rId12"/>
     <p:sldId id="267" r:id="rId13"/>
+    <p:sldId id="271" r:id="rId14"/>
   </p:sldIdLst>
   <p:sldSz cx="12192000" cy="6858000"/>
   <p:notesSz cx="6858000" cy="9144000"/>
@@ -3482,6 +3483,53 @@
           </a:p>
         </p:txBody>
       </p:sp>
+      <p:pic>
+        <p:nvPicPr>
+          <p:cNvPr id="1026" name="Picture 2">
+            <a:extLst>
+              <a:ext uri="{FF2B5EF4-FFF2-40B4-BE49-F238E27FC236}">
+                <a16:creationId xmlns:a16="http://schemas.microsoft.com/office/drawing/2014/main" id="{37BE3F07-6242-360E-9EFE-150A7B191C8F}"/>
+              </a:ext>
+            </a:extLst>
+          </p:cNvPr>
+          <p:cNvPicPr>
+            <a:picLocks noChangeAspect="1" noChangeArrowheads="1"/>
+          </p:cNvPicPr>
+          <p:nvPr/>
+        </p:nvPicPr>
+        <p:blipFill>
+          <a:blip r:embed="rId3">
+            <a:extLst>
+              <a:ext uri="{28A0092B-C50C-407E-A947-70E740481C1C}">
+                <a14:useLocalDpi xmlns:a14="http://schemas.microsoft.com/office/drawing/2010/main" val="0"/>
+              </a:ext>
+            </a:extLst>
+          </a:blip>
+          <a:srcRect/>
+          <a:stretch>
+            <a:fillRect/>
+          </a:stretch>
+        </p:blipFill>
+        <p:spPr bwMode="auto">
+          <a:xfrm>
+            <a:off x="9113233" y="370936"/>
+            <a:ext cx="2564921" cy="3847381"/>
+          </a:xfrm>
+          <a:prstGeom prst="rect">
+            <a:avLst/>
+          </a:prstGeom>
+          <a:noFill/>
+          <a:extLst>
+            <a:ext uri="{909E8E84-426E-40DD-AFC4-6F175D3DCCD1}">
+              <a14:hiddenFill xmlns:a14="http://schemas.microsoft.com/office/drawing/2010/main">
+                <a:solidFill>
+                  <a:srgbClr val="FFFFFF"/>
+                </a:solidFill>
+              </a14:hiddenFill>
+            </a:ext>
+          </a:extLst>
+        </p:spPr>
+      </p:pic>
     </p:spTree>
   </p:cSld>
   <p:clrMapOvr>
@@ -3684,6 +3732,41 @@
           </a:p>
         </p:txBody>
       </p:sp>
+      <p:sp>
+        <p:nvSpPr>
+          <p:cNvPr id="4" name="TextBox 3">
+            <a:extLst>
+              <a:ext uri="{FF2B5EF4-FFF2-40B4-BE49-F238E27FC236}">
+                <a16:creationId xmlns:a16="http://schemas.microsoft.com/office/drawing/2014/main" id="{7A92B7BB-739A-6AE7-26BB-2FA2AE63D1A2}"/>
+              </a:ext>
+            </a:extLst>
+          </p:cNvPr>
+          <p:cNvSpPr txBox="1"/>
+          <p:nvPr/>
+        </p:nvSpPr>
+        <p:spPr>
+          <a:xfrm>
+            <a:off x="3856007" y="4675517"/>
+            <a:ext cx="3774110" cy="646331"/>
+          </a:xfrm>
+          <a:prstGeom prst="rect">
+            <a:avLst/>
+          </a:prstGeom>
+          <a:noFill/>
+        </p:spPr>
+        <p:txBody>
+          <a:bodyPr wrap="none" rtlCol="0">
+            <a:spAutoFit/>
+          </a:bodyPr>
+          <a:lstStyle/>
+          <a:p>
+            <a:r>
+              <a:rPr lang="en-GB" sz="3600" b="1" dirty="0"/>
+              <a:t>&lt;demonstration&gt;</a:t>
+            </a:r>
+          </a:p>
+        </p:txBody>
+      </p:sp>
     </p:spTree>
   </p:cSld>
   <p:clrMapOvr>
@@ -3793,6 +3876,97 @@
 </p:sld>
 </file>
 
+<file path=ppt/slides/slide13.xml><?xml version="1.0" encoding="utf-8"?>
+<p:sld xmlns:a="http://schemas.openxmlformats.org/drawingml/2006/main" xmlns:r="http://schemas.openxmlformats.org/officeDocument/2006/relationships" xmlns:p="http://schemas.openxmlformats.org/presentationml/2006/main">
+  <p:cSld>
+    <p:spTree>
+      <p:nvGrpSpPr>
+        <p:cNvPr id="1" name=""/>
+        <p:cNvGrpSpPr/>
+        <p:nvPr/>
+      </p:nvGrpSpPr>
+      <p:grpSpPr>
+        <a:xfrm>
+          <a:off x="0" y="0"/>
+          <a:ext cx="0" cy="0"/>
+          <a:chOff x="0" y="0"/>
+          <a:chExt cx="0" cy="0"/>
+        </a:xfrm>
+      </p:grpSpPr>
+      <p:sp>
+        <p:nvSpPr>
+          <p:cNvPr id="2" name="Title 1">
+            <a:extLst>
+              <a:ext uri="{FF2B5EF4-FFF2-40B4-BE49-F238E27FC236}">
+                <a16:creationId xmlns:a16="http://schemas.microsoft.com/office/drawing/2014/main" id="{8525C2D7-E417-70EE-D336-6C2729628304}"/>
+              </a:ext>
+            </a:extLst>
+          </p:cNvPr>
+          <p:cNvSpPr>
+            <a:spLocks noGrp="1"/>
+          </p:cNvSpPr>
+          <p:nvPr>
+            <p:ph type="title"/>
+          </p:nvPr>
+        </p:nvSpPr>
+        <p:spPr/>
+        <p:txBody>
+          <a:bodyPr/>
+          <a:lstStyle/>
+          <a:p>
+            <a:pPr marL="0" lvl="0" indent="0">
+              <a:buNone/>
+            </a:pPr>
+            <a:r>
+              <a:t>Practice Exercises</a:t>
+            </a:r>
+          </a:p>
+        </p:txBody>
+      </p:sp>
+      <p:pic>
+        <p:nvPicPr>
+          <p:cNvPr id="6" name="Picture 5" descr="A cat sitting on a computer&#10;&#10;AI-generated content may be incorrect.">
+            <a:extLst>
+              <a:ext uri="{FF2B5EF4-FFF2-40B4-BE49-F238E27FC236}">
+                <a16:creationId xmlns:a16="http://schemas.microsoft.com/office/drawing/2014/main" id="{D2E0F507-A649-BEC3-934D-D62F9A7982A2}"/>
+              </a:ext>
+            </a:extLst>
+          </p:cNvPr>
+          <p:cNvPicPr>
+            <a:picLocks noChangeAspect="1"/>
+          </p:cNvPicPr>
+          <p:nvPr/>
+        </p:nvPicPr>
+        <p:blipFill>
+          <a:blip r:embed="rId2">
+            <a:extLst>
+              <a:ext uri="{28A0092B-C50C-407E-A947-70E740481C1C}">
+                <a14:useLocalDpi xmlns:a14="http://schemas.microsoft.com/office/drawing/2010/main" val="0"/>
+              </a:ext>
+            </a:extLst>
+          </a:blip>
+          <a:stretch>
+            <a:fillRect/>
+          </a:stretch>
+        </p:blipFill>
+        <p:spPr>
+          <a:xfrm>
+            <a:off x="2154453" y="1417320"/>
+            <a:ext cx="7883093" cy="5255395"/>
+          </a:xfrm>
+          <a:prstGeom prst="rect">
+            <a:avLst/>
+          </a:prstGeom>
+        </p:spPr>
+      </p:pic>
+    </p:spTree>
+  </p:cSld>
+  <p:clrMapOvr>
+    <a:masterClrMapping/>
+  </p:clrMapOvr>
+</p:sld>
+</file>
+
 <file path=ppt/slides/slide2.xml><?xml version="1.0" encoding="utf-8"?>
 <p:sld xmlns:a="http://schemas.openxmlformats.org/drawingml/2006/main" xmlns:r="http://schemas.openxmlformats.org/officeDocument/2006/relationships" xmlns:p="http://schemas.openxmlformats.org/presentationml/2006/main">
   <p:cSld>
@@ -4088,6 +4262,41 @@
           </a:p>
         </p:txBody>
       </p:sp>
+      <p:sp>
+        <p:nvSpPr>
+          <p:cNvPr id="4" name="TextBox 3">
+            <a:extLst>
+              <a:ext uri="{FF2B5EF4-FFF2-40B4-BE49-F238E27FC236}">
+                <a16:creationId xmlns:a16="http://schemas.microsoft.com/office/drawing/2014/main" id="{BDA005F6-A970-2231-79EA-BBD728E34A56}"/>
+              </a:ext>
+            </a:extLst>
+          </p:cNvPr>
+          <p:cNvSpPr txBox="1"/>
+          <p:nvPr/>
+        </p:nvSpPr>
+        <p:spPr>
+          <a:xfrm>
+            <a:off x="3856007" y="4675517"/>
+            <a:ext cx="3774110" cy="646331"/>
+          </a:xfrm>
+          <a:prstGeom prst="rect">
+            <a:avLst/>
+          </a:prstGeom>
+          <a:noFill/>
+        </p:spPr>
+        <p:txBody>
+          <a:bodyPr wrap="none" rtlCol="0">
+            <a:spAutoFit/>
+          </a:bodyPr>
+          <a:lstStyle/>
+          <a:p>
+            <a:r>
+              <a:rPr lang="en-GB" sz="3600" b="1" dirty="0"/>
+              <a:t>&lt;demonstration&gt;</a:t>
+            </a:r>
+          </a:p>
+        </p:txBody>
+      </p:sp>
     </p:spTree>
   </p:cSld>
   <p:clrMapOvr>
@@ -4166,29 +4375,71 @@
           <a:p>
             <a:pPr lvl="0"/>
             <a:r>
-              <a:t>Appears at top between triple dashes (—)</a:t>
-            </a:r>
-          </a:p>
-          <a:p>
-            <a:pPr lvl="0"/>
-            <a:r>
+              <a:rPr dirty="0"/>
+              <a:t>Appears at top between triple dashes (</a:t>
+            </a:r>
+            <a:r>
+              <a:rPr lang="en-GB" dirty="0"/>
+              <a:t>---</a:t>
+            </a:r>
+            <a:r>
+              <a:rPr dirty="0"/>
+              <a:t>)</a:t>
+            </a:r>
+          </a:p>
+          <a:p>
+            <a:pPr lvl="0"/>
+            <a:r>
+              <a:rPr dirty="0"/>
               <a:t>Contains document metadata and formatting options</a:t>
             </a:r>
           </a:p>
           <a:p>
             <a:pPr lvl="0"/>
             <a:r>
+              <a:rPr dirty="0"/>
               <a:t>Customize output format, table of contents, themes</a:t>
             </a:r>
           </a:p>
           <a:p>
             <a:pPr lvl="0"/>
             <a:r>
+              <a:rPr dirty="0"/>
               <a:t>Can include dynamic dates and advanced formatting</a:t>
             </a:r>
           </a:p>
         </p:txBody>
       </p:sp>
+      <p:pic>
+        <p:nvPicPr>
+          <p:cNvPr id="5" name="Picture 4">
+            <a:extLst>
+              <a:ext uri="{FF2B5EF4-FFF2-40B4-BE49-F238E27FC236}">
+                <a16:creationId xmlns:a16="http://schemas.microsoft.com/office/drawing/2014/main" id="{350F9480-344E-5DA5-5E5B-37DA8EA1A766}"/>
+              </a:ext>
+            </a:extLst>
+          </p:cNvPr>
+          <p:cNvPicPr>
+            <a:picLocks noChangeAspect="1"/>
+          </p:cNvPicPr>
+          <p:nvPr/>
+        </p:nvPicPr>
+        <p:blipFill>
+          <a:blip r:embed="rId2"/>
+          <a:stretch>
+            <a:fillRect/>
+          </a:stretch>
+        </p:blipFill>
+        <p:spPr>
+          <a:xfrm>
+            <a:off x="2890754" y="4182269"/>
+            <a:ext cx="4321997" cy="2310606"/>
+          </a:xfrm>
+          <a:prstGeom prst="rect">
+            <a:avLst/>
+          </a:prstGeom>
+        </p:spPr>
+      </p:pic>
     </p:spTree>
   </p:cSld>
   <p:clrMapOvr>
@@ -4301,6 +4552,36 @@
           </a:p>
         </p:txBody>
       </p:sp>
+      <p:pic>
+        <p:nvPicPr>
+          <p:cNvPr id="5" name="Picture 4">
+            <a:extLst>
+              <a:ext uri="{FF2B5EF4-FFF2-40B4-BE49-F238E27FC236}">
+                <a16:creationId xmlns:a16="http://schemas.microsoft.com/office/drawing/2014/main" id="{143B4CA4-A189-09DF-3B96-33CFD89CAB47}"/>
+              </a:ext>
+            </a:extLst>
+          </p:cNvPr>
+          <p:cNvPicPr>
+            <a:picLocks noChangeAspect="1"/>
+          </p:cNvPicPr>
+          <p:nvPr/>
+        </p:nvPicPr>
+        <p:blipFill>
+          <a:blip r:embed="rId2"/>
+          <a:stretch>
+            <a:fillRect/>
+          </a:stretch>
+        </p:blipFill>
+        <p:spPr>
+          <a:xfrm>
+            <a:off x="3508939" y="3967568"/>
+            <a:ext cx="3745876" cy="2728478"/>
+          </a:xfrm>
+          <a:prstGeom prst="rect">
+            <a:avLst/>
+          </a:prstGeom>
+        </p:spPr>
+      </p:pic>
     </p:spTree>
   </p:cSld>
   <p:clrMapOvr>
@@ -4402,6 +4683,37 @@
           </a:p>
         </p:txBody>
       </p:sp>
+      <p:pic>
+        <p:nvPicPr>
+          <p:cNvPr id="5" name="Picture 4">
+            <a:extLst>
+              <a:ext uri="{FF2B5EF4-FFF2-40B4-BE49-F238E27FC236}">
+                <a16:creationId xmlns:a16="http://schemas.microsoft.com/office/drawing/2014/main" id="{C1E5ABDB-FC2A-BA98-DBC5-DE24C7FF6A5F}"/>
+              </a:ext>
+            </a:extLst>
+          </p:cNvPr>
+          <p:cNvPicPr>
+            <a:picLocks noChangeAspect="1"/>
+          </p:cNvPicPr>
+          <p:nvPr/>
+        </p:nvPicPr>
+        <p:blipFill>
+          <a:blip r:embed="rId2"/>
+          <a:srcRect b="21111"/>
+          <a:stretch>
+            <a:fillRect/>
+          </a:stretch>
+        </p:blipFill>
+        <p:spPr>
+          <a:xfrm>
+            <a:off x="4929800" y="4545605"/>
+            <a:ext cx="2332399" cy="975301"/>
+          </a:xfrm>
+          <a:prstGeom prst="rect">
+            <a:avLst/>
+          </a:prstGeom>
+        </p:spPr>
+      </p:pic>
     </p:spTree>
   </p:cSld>
   <p:clrMapOvr>

</xml_diff>